<commit_message>
Updates CAEX 3.0 metamodel with missing ref. attribute references.
Adds new reference Attribute.referenceAttribute : Attribute [0..1] in
accordance with the introduced attribute Attribute.refAttributeType :
String [0..1]
</commit_message>
<xml_diff>
--- a/documentation/CAEX30/CAEX30-Metamodel-Documentation.pptx
+++ b/documentation/CAEX30/CAEX30-Metamodel-Documentation.pptx
@@ -3022,35 +3022,6 @@
           </a:p>
         </p:txBody>
       </p:sp>
-      <p:pic>
-        <p:nvPicPr>
-          <p:cNvPr id="4" name="Inhaltsplatzhalter 3"/>
-          <p:cNvPicPr>
-            <a:picLocks noGrp="1" noChangeAspect="1"/>
-          </p:cNvPicPr>
-          <p:nvPr>
-            <p:ph idx="1"/>
-          </p:nvPr>
-        </p:nvPicPr>
-        <p:blipFill>
-          <a:blip r:embed="rId2" cstate="print">
-            <a:extLst>
-              <a:ext uri="{28A0092B-C50C-407E-A947-70E740481C1C}">
-                <a14:useLocalDpi xmlns:a14="http://schemas.microsoft.com/office/drawing/2010/main" val="0"/>
-              </a:ext>
-            </a:extLst>
-          </a:blip>
-          <a:stretch>
-            <a:fillRect/>
-          </a:stretch>
-        </p:blipFill>
-        <p:spPr>
-          <a:xfrm>
-            <a:off x="301625" y="1206745"/>
-            <a:ext cx="11557000" cy="5263660"/>
-          </a:xfrm>
-        </p:spPr>
-      </p:pic>
       <p:sp>
         <p:nvSpPr>
           <p:cNvPr id="8" name="Abgerundetes Rechteck 7"/>
@@ -3110,6 +3081,35 @@
           </a:p>
         </p:txBody>
       </p:sp>
+      <p:pic>
+        <p:nvPicPr>
+          <p:cNvPr id="5" name="Inhaltsplatzhalter 4"/>
+          <p:cNvPicPr>
+            <a:picLocks noGrp="1" noChangeAspect="1"/>
+          </p:cNvPicPr>
+          <p:nvPr>
+            <p:ph idx="1"/>
+          </p:nvPr>
+        </p:nvPicPr>
+        <p:blipFill>
+          <a:blip r:embed="rId2" cstate="print">
+            <a:extLst>
+              <a:ext uri="{28A0092B-C50C-407E-A947-70E740481C1C}">
+                <a14:useLocalDpi xmlns:a14="http://schemas.microsoft.com/office/drawing/2010/main" val="0"/>
+              </a:ext>
+            </a:extLst>
+          </a:blip>
+          <a:stretch>
+            <a:fillRect/>
+          </a:stretch>
+        </p:blipFill>
+        <p:spPr>
+          <a:xfrm>
+            <a:off x="301625" y="1206745"/>
+            <a:ext cx="11557000" cy="5263660"/>
+          </a:xfrm>
+        </p:spPr>
+      </p:pic>
     </p:spTree>
     <p:extLst>
       <p:ext uri="{BB962C8B-B14F-4D97-AF65-F5344CB8AC3E}">
@@ -3120,6 +3120,13 @@
   <p:clrMapOvr>
     <a:masterClrMapping/>
   </p:clrMapOvr>
+  <p:timing>
+    <p:tnLst>
+      <p:par>
+        <p:cTn id="1" dur="indefinite" restart="never" nodeType="tmRoot"/>
+      </p:par>
+    </p:tnLst>
+  </p:timing>
 </p:sld>
 </file>
 

</xml_diff>